<commit_message>
finishing touches on documents all work integrated into slides small changes in work schedule followed small changes in main document for work breakdown older version of presentation without chris' work moved to old/ directory
</commit_message>
<xml_diff>
--- a/SQA Presentation_updated.pptx
+++ b/SQA Presentation_updated.pptx
@@ -21,11 +21,21 @@
     <p:sldId id="273" r:id="rId15"/>
     <p:sldId id="274" r:id="rId16"/>
     <p:sldId id="275" r:id="rId17"/>
-    <p:sldId id="259" r:id="rId18"/>
-    <p:sldId id="260" r:id="rId19"/>
-    <p:sldId id="276" r:id="rId20"/>
-    <p:sldId id="261" r:id="rId21"/>
-    <p:sldId id="262" r:id="rId22"/>
+    <p:sldId id="277" r:id="rId18"/>
+    <p:sldId id="278" r:id="rId19"/>
+    <p:sldId id="279" r:id="rId20"/>
+    <p:sldId id="280" r:id="rId21"/>
+    <p:sldId id="281" r:id="rId22"/>
+    <p:sldId id="282" r:id="rId23"/>
+    <p:sldId id="283" r:id="rId24"/>
+    <p:sldId id="284" r:id="rId25"/>
+    <p:sldId id="285" r:id="rId26"/>
+    <p:sldId id="286" r:id="rId27"/>
+    <p:sldId id="287" r:id="rId28"/>
+    <p:sldId id="260" r:id="rId29"/>
+    <p:sldId id="276" r:id="rId30"/>
+    <p:sldId id="261" r:id="rId31"/>
+    <p:sldId id="262" r:id="rId32"/>
   </p:sldIdLst>
   <p:sldSz cx="12192000" cy="6858000"/>
   <p:notesSz cx="6858000" cy="9144000"/>
@@ -854,7 +864,7 @@
           <a:p>
             <a:fld id="{48A87A34-81AB-432B-8DAE-1953F412C126}" type="datetimeFigureOut">
               <a:rPr lang="en-US" smtClean="0"/>
-              <a:t>11/24/2016</a:t>
+              <a:t>11/28/2016</a:t>
             </a:fld>
             <a:endParaRPr lang="en-US" dirty="0"/>
           </a:p>
@@ -1106,7 +1116,7 @@
             <a:fld id="{48A87A34-81AB-432B-8DAE-1953F412C126}" type="datetimeFigureOut">
               <a:rPr lang="en-US" smtClean="0"/>
               <a:pPr/>
-              <a:t>11/24/2016</a:t>
+              <a:t>11/28/2016</a:t>
             </a:fld>
             <a:endParaRPr lang="en-US" dirty="0"/>
           </a:p>
@@ -1422,7 +1432,7 @@
             <a:fld id="{48A87A34-81AB-432B-8DAE-1953F412C126}" type="datetimeFigureOut">
               <a:rPr lang="en-US" smtClean="0"/>
               <a:pPr/>
-              <a:t>11/24/2016</a:t>
+              <a:t>11/28/2016</a:t>
             </a:fld>
             <a:endParaRPr lang="en-US" dirty="0"/>
           </a:p>
@@ -1765,7 +1775,7 @@
             <a:fld id="{48A87A34-81AB-432B-8DAE-1953F412C126}" type="datetimeFigureOut">
               <a:rPr lang="en-US" smtClean="0"/>
               <a:pPr/>
-              <a:t>11/24/2016</a:t>
+              <a:t>11/28/2016</a:t>
             </a:fld>
             <a:endParaRPr lang="en-US" dirty="0"/>
           </a:p>
@@ -2081,7 +2091,7 @@
             <a:fld id="{48A87A34-81AB-432B-8DAE-1953F412C126}" type="datetimeFigureOut">
               <a:rPr lang="en-US" smtClean="0"/>
               <a:pPr/>
-              <a:t>11/24/2016</a:t>
+              <a:t>11/28/2016</a:t>
             </a:fld>
             <a:endParaRPr lang="en-US" dirty="0"/>
           </a:p>
@@ -2476,7 +2486,7 @@
             <a:fld id="{48A87A34-81AB-432B-8DAE-1953F412C126}" type="datetimeFigureOut">
               <a:rPr lang="en-US" smtClean="0"/>
               <a:pPr/>
-              <a:t>11/24/2016</a:t>
+              <a:t>11/28/2016</a:t>
             </a:fld>
             <a:endParaRPr lang="en-US" dirty="0"/>
           </a:p>
@@ -2647,7 +2657,7 @@
           <a:p>
             <a:fld id="{48A87A34-81AB-432B-8DAE-1953F412C126}" type="datetimeFigureOut">
               <a:rPr lang="en-US" smtClean="0"/>
-              <a:t>11/24/2016</a:t>
+              <a:t>11/28/2016</a:t>
             </a:fld>
             <a:endParaRPr lang="en-US" dirty="0"/>
           </a:p>
@@ -2827,7 +2837,7 @@
           <a:p>
             <a:fld id="{48A87A34-81AB-432B-8DAE-1953F412C126}" type="datetimeFigureOut">
               <a:rPr lang="en-US" smtClean="0"/>
-              <a:t>11/24/2016</a:t>
+              <a:t>11/28/2016</a:t>
             </a:fld>
             <a:endParaRPr lang="en-US" dirty="0"/>
           </a:p>
@@ -3003,7 +3013,7 @@
           <a:p>
             <a:fld id="{48A87A34-81AB-432B-8DAE-1953F412C126}" type="datetimeFigureOut">
               <a:rPr lang="en-US" smtClean="0"/>
-              <a:t>11/24/2016</a:t>
+              <a:t>11/28/2016</a:t>
             </a:fld>
             <a:endParaRPr lang="en-US" dirty="0"/>
           </a:p>
@@ -3250,7 +3260,7 @@
           <a:p>
             <a:fld id="{48A87A34-81AB-432B-8DAE-1953F412C126}" type="datetimeFigureOut">
               <a:rPr lang="en-US" smtClean="0"/>
-              <a:t>11/24/2016</a:t>
+              <a:t>11/28/2016</a:t>
             </a:fld>
             <a:endParaRPr lang="en-US" dirty="0"/>
           </a:p>
@@ -3482,7 +3492,7 @@
           <a:p>
             <a:fld id="{48A87A34-81AB-432B-8DAE-1953F412C126}" type="datetimeFigureOut">
               <a:rPr lang="en-US" smtClean="0"/>
-              <a:t>11/24/2016</a:t>
+              <a:t>11/28/2016</a:t>
             </a:fld>
             <a:endParaRPr lang="en-US" dirty="0"/>
           </a:p>
@@ -3856,7 +3866,7 @@
           <a:p>
             <a:fld id="{48A87A34-81AB-432B-8DAE-1953F412C126}" type="datetimeFigureOut">
               <a:rPr lang="en-US" smtClean="0"/>
-              <a:t>11/24/2016</a:t>
+              <a:t>11/28/2016</a:t>
             </a:fld>
             <a:endParaRPr lang="en-US" dirty="0"/>
           </a:p>
@@ -3979,7 +3989,7 @@
           <a:p>
             <a:fld id="{48A87A34-81AB-432B-8DAE-1953F412C126}" type="datetimeFigureOut">
               <a:rPr lang="en-US" smtClean="0"/>
-              <a:t>11/24/2016</a:t>
+              <a:t>11/28/2016</a:t>
             </a:fld>
             <a:endParaRPr lang="en-US" dirty="0"/>
           </a:p>
@@ -4074,7 +4084,7 @@
           <a:p>
             <a:fld id="{48A87A34-81AB-432B-8DAE-1953F412C126}" type="datetimeFigureOut">
               <a:rPr lang="en-US" smtClean="0"/>
-              <a:t>11/24/2016</a:t>
+              <a:t>11/28/2016</a:t>
             </a:fld>
             <a:endParaRPr lang="en-US" dirty="0"/>
           </a:p>
@@ -4329,7 +4339,7 @@
           <a:p>
             <a:fld id="{48A87A34-81AB-432B-8DAE-1953F412C126}" type="datetimeFigureOut">
               <a:rPr lang="en-US" smtClean="0"/>
-              <a:t>11/24/2016</a:t>
+              <a:t>11/28/2016</a:t>
             </a:fld>
             <a:endParaRPr lang="en-US" dirty="0"/>
           </a:p>
@@ -4592,7 +4602,7 @@
           <a:p>
             <a:fld id="{48A87A34-81AB-432B-8DAE-1953F412C126}" type="datetimeFigureOut">
               <a:rPr lang="en-US" smtClean="0"/>
-              <a:t>11/24/2016</a:t>
+              <a:t>11/28/2016</a:t>
             </a:fld>
             <a:endParaRPr lang="en-US" dirty="0"/>
           </a:p>
@@ -5336,7 +5346,7 @@
             <a:fld id="{48A87A34-81AB-432B-8DAE-1953F412C126}" type="datetimeFigureOut">
               <a:rPr lang="en-US" smtClean="0"/>
               <a:pPr/>
-              <a:t>11/24/2016</a:t>
+              <a:t>11/28/2016</a:t>
             </a:fld>
             <a:endParaRPr lang="en-US" dirty="0"/>
           </a:p>
@@ -6758,7 +6768,15 @@
           <a:p>
             <a:r>
               <a:rPr lang="en-GB" dirty="0"/>
-              <a:t>Mini-Exercise</a:t>
+              <a:t>Mini-Exercise </a:t>
+            </a:r>
+            <a:r>
+              <a:rPr lang="en-GB" dirty="0" err="1"/>
+              <a:t>Sahi’s</a:t>
+            </a:r>
+            <a:r>
+              <a:rPr lang="en-GB" dirty="0"/>
+              <a:t> Sample Application</a:t>
             </a:r>
           </a:p>
         </p:txBody>
@@ -6778,14 +6796,102 @@
           <a:bodyPr/>
           <a:lstStyle/>
           <a:p>
-            <a:endParaRPr lang="en-GB"/>
-          </a:p>
-        </p:txBody>
-      </p:sp>
+            <a:r>
+              <a:rPr lang="en-GB" dirty="0" err="1"/>
+              <a:t>Sahi</a:t>
+            </a:r>
+            <a:r>
+              <a:rPr lang="en-GB" dirty="0"/>
+              <a:t> Overview (Main Points)</a:t>
+            </a:r>
+          </a:p>
+          <a:p>
+            <a:r>
+              <a:rPr lang="en-GB" dirty="0"/>
+              <a:t>Launch Browser – Opens a new browser of choice with a proxy enabled.</a:t>
+            </a:r>
+          </a:p>
+          <a:p>
+            <a:r>
+              <a:rPr lang="en-GB" dirty="0"/>
+              <a:t>Configure – Opens the config menu in a browser window. New browsers can be added as well as the option to return a 404error for certain sites accessed.</a:t>
+            </a:r>
+          </a:p>
+          <a:p>
+            <a:r>
+              <a:rPr lang="en-GB" dirty="0"/>
+              <a:t>Scripts – Opens the folder where all user recorded scripts are saved.</a:t>
+            </a:r>
+          </a:p>
+          <a:p>
+            <a:r>
+              <a:rPr lang="en-GB" dirty="0"/>
+              <a:t>Editor(Pro version only) – Opens the SAHI editor.</a:t>
+            </a:r>
+          </a:p>
+          <a:p>
+            <a:r>
+              <a:rPr lang="en-GB" dirty="0"/>
+              <a:t>Docs – Opens the SAHI documentation site.</a:t>
+            </a:r>
+          </a:p>
+          <a:p>
+            <a:r>
+              <a:rPr lang="en-GB" dirty="0"/>
+              <a:t>Logs – View the results from all tests conducted.</a:t>
+            </a:r>
+          </a:p>
+          <a:p>
+            <a:pPr marL="0" indent="0">
+              <a:buNone/>
+            </a:pPr>
+            <a:r>
+              <a:rPr lang="en-GB" dirty="0"/>
+              <a:t>                                                    </a:t>
+            </a:r>
+          </a:p>
+          <a:p>
+            <a:pPr marL="0" indent="0">
+              <a:buNone/>
+            </a:pPr>
+            <a:r>
+              <a:rPr lang="en-GB" dirty="0"/>
+              <a:t> </a:t>
+            </a:r>
+          </a:p>
+          <a:p>
+            <a:endParaRPr lang="en-GB" dirty="0"/>
+          </a:p>
+        </p:txBody>
+      </p:sp>
+      <p:pic>
+        <p:nvPicPr>
+          <p:cNvPr id="4" name="Picture 3"/>
+          <p:cNvPicPr>
+            <a:picLocks noChangeAspect="1"/>
+          </p:cNvPicPr>
+          <p:nvPr/>
+        </p:nvPicPr>
+        <p:blipFill>
+          <a:blip r:embed="rId2"/>
+          <a:stretch>
+            <a:fillRect/>
+          </a:stretch>
+        </p:blipFill>
+        <p:spPr>
+          <a:xfrm>
+            <a:off x="9274002" y="217714"/>
+            <a:ext cx="2119712" cy="6394078"/>
+          </a:xfrm>
+          <a:prstGeom prst="rect">
+            <a:avLst/>
+          </a:prstGeom>
+        </p:spPr>
+      </p:pic>
     </p:spTree>
     <p:extLst>
       <p:ext uri="{BB962C8B-B14F-4D97-AF65-F5344CB8AC3E}">
-        <p14:creationId xmlns:p14="http://schemas.microsoft.com/office/powerpoint/2010/main" val="1700315807"/>
+        <p14:creationId xmlns:p14="http://schemas.microsoft.com/office/powerpoint/2010/main" val="3575006299"/>
       </p:ext>
     </p:extLst>
   </p:cSld>
@@ -6828,8 +6934,8 @@
           <a:lstStyle/>
           <a:p>
             <a:r>
-              <a:rPr lang="en-GB" dirty="0"/>
-              <a:t>Strengths and Weaknesses</a:t>
+              <a:rPr lang="en-IE" dirty="0"/>
+              <a:t>Exercise – Record a test script using the Sample site</a:t>
             </a:r>
           </a:p>
         </p:txBody>
@@ -6850,68 +6956,49 @@
           <a:lstStyle/>
           <a:p>
             <a:r>
-              <a:rPr lang="en-GB" dirty="0"/>
-              <a:t>Easy to set up :Open source tool therefore it is available to everyone. When downloading it no additional tools are required . Tests run from the </a:t>
-            </a:r>
-            <a:r>
-              <a:rPr lang="en-GB" dirty="0" err="1"/>
-              <a:t>Sahi</a:t>
-            </a:r>
-            <a:r>
-              <a:rPr lang="en-GB" dirty="0"/>
-              <a:t> controller/command line.</a:t>
-            </a:r>
-            <a:endParaRPr lang="en-US" dirty="0"/>
-          </a:p>
-          <a:p>
-            <a:r>
-              <a:rPr lang="en-US" dirty="0"/>
-              <a:t>Efficiency- </a:t>
-            </a:r>
-            <a:r>
-              <a:rPr lang="en-US" dirty="0" err="1"/>
-              <a:t>Sahi</a:t>
-            </a:r>
-            <a:r>
-              <a:rPr lang="en-US" dirty="0"/>
-              <a:t> has made the testing process more efficient. It handles the repetitive, time consuming tests and it allows the team to focus on the tricky ones. This process allows the team to be more efficient  therefore saving time and money and also generate a high ROI.</a:t>
-            </a:r>
-          </a:p>
-          <a:p>
-            <a:r>
-              <a:rPr lang="en-GB" dirty="0"/>
-              <a:t>Consistent Platform :</a:t>
-            </a:r>
-            <a:r>
-              <a:rPr lang="en-US" dirty="0"/>
+              <a:rPr lang="en-IE" dirty="0"/>
+              <a:t>Step One: Launch a browser through SAHI and click the sample application link.</a:t>
+            </a:r>
+          </a:p>
+          <a:p>
+            <a:pPr marL="0" indent="0">
+              <a:buNone/>
+            </a:pPr>
+            <a:r>
+              <a:rPr lang="en-IE" dirty="0"/>
               <a:t> </a:t>
             </a:r>
-            <a:r>
-              <a:rPr lang="en-US" dirty="0" err="1"/>
-              <a:t>Sahi</a:t>
-            </a:r>
-            <a:r>
-              <a:rPr lang="en-US" dirty="0"/>
-              <a:t> has the ability to run on all browsers. This reduces the number of errors in the testing scenario by going through pre-recorded instructions. </a:t>
-            </a:r>
-            <a:r>
-              <a:rPr lang="en-US" dirty="0" err="1"/>
-              <a:t>Sahi</a:t>
-            </a:r>
-            <a:r>
-              <a:rPr lang="en-US" dirty="0"/>
-              <a:t> scripts are fast to create and very easy to maintain</a:t>
-            </a:r>
-          </a:p>
-          <a:p>
-            <a:endParaRPr lang="en-GB" dirty="0"/>
-          </a:p>
-        </p:txBody>
-      </p:sp>
+          </a:p>
+        </p:txBody>
+      </p:sp>
+      <p:pic>
+        <p:nvPicPr>
+          <p:cNvPr id="4" name="Picture 3"/>
+          <p:cNvPicPr>
+            <a:picLocks noChangeAspect="1"/>
+          </p:cNvPicPr>
+          <p:nvPr/>
+        </p:nvPicPr>
+        <p:blipFill>
+          <a:blip r:embed="rId2"/>
+          <a:stretch>
+            <a:fillRect/>
+          </a:stretch>
+        </p:blipFill>
+        <p:spPr>
+          <a:xfrm>
+            <a:off x="2270709" y="2554546"/>
+            <a:ext cx="4918461" cy="3717005"/>
+          </a:xfrm>
+          <a:prstGeom prst="rect">
+            <a:avLst/>
+          </a:prstGeom>
+        </p:spPr>
+      </p:pic>
     </p:spTree>
     <p:extLst>
       <p:ext uri="{BB962C8B-B14F-4D97-AF65-F5344CB8AC3E}">
-        <p14:creationId xmlns:p14="http://schemas.microsoft.com/office/powerpoint/2010/main" val="3672077178"/>
+        <p14:creationId xmlns:p14="http://schemas.microsoft.com/office/powerpoint/2010/main" val="1915122651"/>
       </p:ext>
     </p:extLst>
   </p:cSld>
@@ -6948,14 +7035,21 @@
             <p:ph type="title"/>
           </p:nvPr>
         </p:nvSpPr>
-        <p:spPr/>
-        <p:txBody>
-          <a:bodyPr/>
-          <a:lstStyle/>
-          <a:p>
-            <a:r>
-              <a:rPr lang="en-GB" dirty="0"/>
-              <a:t>Strengths and Weaknesses</a:t>
+        <p:spPr>
+          <a:xfrm>
+            <a:off x="677334" y="609600"/>
+            <a:ext cx="8596668" cy="625642"/>
+          </a:xfrm>
+        </p:spPr>
+        <p:txBody>
+          <a:bodyPr>
+            <a:normAutofit fontScale="90000"/>
+          </a:bodyPr>
+          <a:lstStyle/>
+          <a:p>
+            <a:r>
+              <a:rPr lang="en-IE" dirty="0"/>
+              <a:t> </a:t>
             </a:r>
           </a:p>
         </p:txBody>
@@ -6970,50 +7064,63 @@
             <p:ph idx="1"/>
           </p:nvPr>
         </p:nvSpPr>
-        <p:spPr/>
-        <p:txBody>
-          <a:bodyPr/>
-          <a:lstStyle/>
-          <a:p>
-            <a:r>
-              <a:rPr lang="en-US" dirty="0"/>
-              <a:t>Support for multiple languages: SAHI uses </a:t>
-            </a:r>
-            <a:r>
-              <a:rPr lang="en-US" dirty="0" err="1"/>
-              <a:t>Javascript</a:t>
-            </a:r>
-            <a:r>
-              <a:rPr lang="en-US" dirty="0"/>
-              <a:t> as its base language. Currently SAHI does not let you create your test cases in other language.</a:t>
-            </a:r>
-          </a:p>
-          <a:p>
-            <a:r>
-              <a:rPr lang="en-GB" dirty="0" err="1"/>
-              <a:t>Sahi</a:t>
-            </a:r>
-            <a:r>
-              <a:rPr lang="en-GB" dirty="0"/>
-              <a:t> application runs separate from the record window.</a:t>
-            </a:r>
-          </a:p>
-          <a:p>
-            <a:r>
-              <a:rPr lang="en-GB" dirty="0"/>
-              <a:t>Browser has to be configured to work with a proxy.</a:t>
-            </a:r>
-            <a:endParaRPr lang="en-US" dirty="0"/>
-          </a:p>
-          <a:p>
-            <a:endParaRPr lang="en-GB" dirty="0"/>
-          </a:p>
-        </p:txBody>
-      </p:sp>
+        <p:spPr>
+          <a:xfrm>
+            <a:off x="677334" y="1363579"/>
+            <a:ext cx="6044308" cy="4677783"/>
+          </a:xfrm>
+        </p:spPr>
+        <p:txBody>
+          <a:bodyPr/>
+          <a:lstStyle/>
+          <a:p>
+            <a:r>
+              <a:rPr lang="en-IE" dirty="0"/>
+              <a:t>To bring up to controller for SAHI hold the alt key and double click the page.</a:t>
+            </a:r>
+          </a:p>
+          <a:p>
+            <a:r>
+              <a:rPr lang="en-IE" dirty="0"/>
+              <a:t>Once the controller is opened Enter a Script name and press record.</a:t>
+            </a:r>
+          </a:p>
+          <a:p>
+            <a:r>
+              <a:rPr lang="en-IE" dirty="0"/>
+              <a:t>The controller is now listening for actions to add to the script.</a:t>
+            </a:r>
+          </a:p>
+        </p:txBody>
+      </p:sp>
+      <p:pic>
+        <p:nvPicPr>
+          <p:cNvPr id="4" name="Picture 3"/>
+          <p:cNvPicPr>
+            <a:picLocks noChangeAspect="1"/>
+          </p:cNvPicPr>
+          <p:nvPr/>
+        </p:nvPicPr>
+        <p:blipFill>
+          <a:blip r:embed="rId2"/>
+          <a:stretch>
+            <a:fillRect/>
+          </a:stretch>
+        </p:blipFill>
+        <p:spPr>
+          <a:xfrm>
+            <a:off x="6962274" y="280538"/>
+            <a:ext cx="5040925" cy="6339500"/>
+          </a:xfrm>
+          <a:prstGeom prst="rect">
+            <a:avLst/>
+          </a:prstGeom>
+        </p:spPr>
+      </p:pic>
     </p:spTree>
     <p:extLst>
       <p:ext uri="{BB962C8B-B14F-4D97-AF65-F5344CB8AC3E}">
-        <p14:creationId xmlns:p14="http://schemas.microsoft.com/office/powerpoint/2010/main" val="4098745075"/>
+        <p14:creationId xmlns:p14="http://schemas.microsoft.com/office/powerpoint/2010/main" val="182869460"/>
       </p:ext>
     </p:extLst>
   </p:cSld>
@@ -7160,36 +7267,62 @@
       </p:grpSpPr>
       <p:sp>
         <p:nvSpPr>
-          <p:cNvPr id="2" name="Title 1"/>
-          <p:cNvSpPr>
-            <a:spLocks noGrp="1"/>
-          </p:cNvSpPr>
-          <p:nvPr>
-            <p:ph type="title"/>
+          <p:cNvPr id="3" name="Content Placeholder 2"/>
+          <p:cNvSpPr>
+            <a:spLocks noGrp="1"/>
+          </p:cNvSpPr>
+          <p:nvPr>
+            <p:ph idx="1"/>
           </p:nvPr>
         </p:nvSpPr>
         <p:spPr>
           <a:xfrm>
-            <a:off x="0" y="3154017"/>
-            <a:ext cx="9541565" cy="1320800"/>
+            <a:off x="677334" y="1299411"/>
+            <a:ext cx="8596668" cy="4741951"/>
           </a:xfrm>
         </p:spPr>
         <p:txBody>
           <a:bodyPr/>
           <a:lstStyle/>
           <a:p>
-            <a:pPr algn="ctr"/>
-            <a:r>
-              <a:rPr lang="en-GB" dirty="0"/>
-              <a:t>Questions?</a:t>
-            </a:r>
-          </a:p>
-        </p:txBody>
-      </p:sp>
+            <a:r>
+              <a:rPr lang="en-IE" dirty="0"/>
+              <a:t>View an elements properties by holding the control key and hovering over the element</a:t>
+            </a:r>
+          </a:p>
+          <a:p>
+            <a:endParaRPr lang="en-IE" dirty="0"/>
+          </a:p>
+        </p:txBody>
+      </p:sp>
+      <p:pic>
+        <p:nvPicPr>
+          <p:cNvPr id="4" name="Picture 3"/>
+          <p:cNvPicPr>
+            <a:picLocks noChangeAspect="1"/>
+          </p:cNvPicPr>
+          <p:nvPr/>
+        </p:nvPicPr>
+        <p:blipFill>
+          <a:blip r:embed="rId2"/>
+          <a:stretch>
+            <a:fillRect/>
+          </a:stretch>
+        </p:blipFill>
+        <p:spPr>
+          <a:xfrm>
+            <a:off x="3634154" y="1650608"/>
+            <a:ext cx="6176596" cy="4390754"/>
+          </a:xfrm>
+          <a:prstGeom prst="rect">
+            <a:avLst/>
+          </a:prstGeom>
+        </p:spPr>
+      </p:pic>
     </p:spTree>
     <p:extLst>
       <p:ext uri="{BB962C8B-B14F-4D97-AF65-F5344CB8AC3E}">
-        <p14:creationId xmlns:p14="http://schemas.microsoft.com/office/powerpoint/2010/main" val="1097807884"/>
+        <p14:creationId xmlns:p14="http://schemas.microsoft.com/office/powerpoint/2010/main" val="3220040368"/>
       </p:ext>
     </p:extLst>
   </p:cSld>
@@ -7218,28 +7351,6 @@
       </p:grpSpPr>
       <p:sp>
         <p:nvSpPr>
-          <p:cNvPr id="2" name="Title 1"/>
-          <p:cNvSpPr>
-            <a:spLocks noGrp="1"/>
-          </p:cNvSpPr>
-          <p:nvPr>
-            <p:ph type="title"/>
-          </p:nvPr>
-        </p:nvSpPr>
-        <p:spPr/>
-        <p:txBody>
-          <a:bodyPr/>
-          <a:lstStyle/>
-          <a:p>
-            <a:r>
-              <a:rPr lang="en-GB" dirty="0"/>
-              <a:t>Team Members</a:t>
-            </a:r>
-          </a:p>
-        </p:txBody>
-      </p:sp>
-      <p:sp>
-        <p:nvSpPr>
           <p:cNvPr id="3" name="Content Placeholder 2"/>
           <p:cNvSpPr>
             <a:spLocks noGrp="1"/>
@@ -7248,62 +7359,1042 @@
             <p:ph idx="1"/>
           </p:nvPr>
         </p:nvSpPr>
-        <p:spPr/>
-        <p:txBody>
-          <a:bodyPr/>
-          <a:lstStyle/>
-          <a:p>
-            <a:r>
-              <a:rPr lang="en-GB" dirty="0" err="1"/>
-              <a:t>Aleksander</a:t>
-            </a:r>
-            <a:r>
-              <a:rPr lang="en-GB" dirty="0"/>
-              <a:t> </a:t>
-            </a:r>
-            <a:r>
-              <a:rPr lang="en-GB" dirty="0" err="1"/>
-              <a:t>Zoric</a:t>
-            </a:r>
-            <a:endParaRPr lang="en-GB" dirty="0"/>
-          </a:p>
-          <a:p>
-            <a:r>
-              <a:rPr lang="en-GB" dirty="0" err="1"/>
-              <a:t>Liranda</a:t>
-            </a:r>
-            <a:r>
-              <a:rPr lang="en-GB" dirty="0"/>
-              <a:t> </a:t>
-            </a:r>
-            <a:r>
-              <a:rPr lang="en-GB" dirty="0" err="1"/>
-              <a:t>Krisniski</a:t>
-            </a:r>
-            <a:endParaRPr lang="en-GB" dirty="0"/>
-          </a:p>
-          <a:p>
-            <a:r>
-              <a:rPr lang="en-GB" dirty="0"/>
-              <a:t>Chris O’Brien</a:t>
-            </a:r>
-          </a:p>
-          <a:p>
-            <a:r>
-              <a:rPr lang="en-GB" dirty="0"/>
-              <a:t>James </a:t>
-            </a:r>
-            <a:r>
-              <a:rPr lang="en-GB"/>
-              <a:t>McGarr</a:t>
-            </a:r>
-          </a:p>
-        </p:txBody>
-      </p:sp>
+        <p:spPr>
+          <a:xfrm>
+            <a:off x="677334" y="481263"/>
+            <a:ext cx="8596668" cy="5560099"/>
+          </a:xfrm>
+        </p:spPr>
+        <p:txBody>
+          <a:bodyPr/>
+          <a:lstStyle/>
+          <a:p>
+            <a:r>
+              <a:rPr lang="en-IE" dirty="0"/>
+              <a:t>Use the provided username/password to login (test/secret)</a:t>
+            </a:r>
+          </a:p>
+          <a:p>
+            <a:r>
+              <a:rPr lang="en-IE" dirty="0"/>
+              <a:t>Once cart screen opens add a few items and press the add button</a:t>
+            </a:r>
+          </a:p>
+          <a:p>
+            <a:r>
+              <a:rPr lang="en-IE" dirty="0"/>
+              <a:t>To assert a value hover over the Total textbox holding the control key</a:t>
+            </a:r>
+          </a:p>
+          <a:p>
+            <a:endParaRPr lang="en-IE" dirty="0"/>
+          </a:p>
+          <a:p>
+            <a:endParaRPr lang="en-IE" dirty="0"/>
+          </a:p>
+          <a:p>
+            <a:endParaRPr lang="en-IE" dirty="0"/>
+          </a:p>
+          <a:p>
+            <a:endParaRPr lang="en-IE" dirty="0"/>
+          </a:p>
+          <a:p>
+            <a:r>
+              <a:rPr lang="en-IE" dirty="0"/>
+              <a:t>The following should appear inside the controller, Press the Assert Button and the following should appear on the controller window.</a:t>
+            </a:r>
+          </a:p>
+          <a:p>
+            <a:endParaRPr lang="en-IE" dirty="0"/>
+          </a:p>
+          <a:p>
+            <a:endParaRPr lang="en-IE" dirty="0"/>
+          </a:p>
+        </p:txBody>
+      </p:sp>
+      <p:pic>
+        <p:nvPicPr>
+          <p:cNvPr id="4" name="Picture 3"/>
+          <p:cNvPicPr>
+            <a:picLocks noChangeAspect="1"/>
+          </p:cNvPicPr>
+          <p:nvPr/>
+        </p:nvPicPr>
+        <p:blipFill>
+          <a:blip r:embed="rId2"/>
+          <a:stretch>
+            <a:fillRect/>
+          </a:stretch>
+        </p:blipFill>
+        <p:spPr>
+          <a:xfrm>
+            <a:off x="2365457" y="1670637"/>
+            <a:ext cx="4333875" cy="1590675"/>
+          </a:xfrm>
+          <a:prstGeom prst="rect">
+            <a:avLst/>
+          </a:prstGeom>
+        </p:spPr>
+      </p:pic>
+      <p:pic>
+        <p:nvPicPr>
+          <p:cNvPr id="5" name="Picture 4"/>
+          <p:cNvPicPr>
+            <a:picLocks noChangeAspect="1"/>
+          </p:cNvPicPr>
+          <p:nvPr/>
+        </p:nvPicPr>
+        <p:blipFill>
+          <a:blip r:embed="rId3"/>
+          <a:stretch>
+            <a:fillRect/>
+          </a:stretch>
+        </p:blipFill>
+        <p:spPr>
+          <a:xfrm>
+            <a:off x="1269677" y="4027725"/>
+            <a:ext cx="6525434" cy="3037702"/>
+          </a:xfrm>
+          <a:prstGeom prst="rect">
+            <a:avLst/>
+          </a:prstGeom>
+        </p:spPr>
+      </p:pic>
     </p:spTree>
     <p:extLst>
       <p:ext uri="{BB962C8B-B14F-4D97-AF65-F5344CB8AC3E}">
-        <p14:creationId xmlns:p14="http://schemas.microsoft.com/office/powerpoint/2010/main" val="1022492772"/>
+        <p14:creationId xmlns:p14="http://schemas.microsoft.com/office/powerpoint/2010/main" val="3014105709"/>
+      </p:ext>
+    </p:extLst>
+  </p:cSld>
+  <p:clrMapOvr>
+    <a:masterClrMapping/>
+  </p:clrMapOvr>
+</p:sld>
+</file>
+
+<file path=ppt/slides/slide22.xml><?xml version="1.0" encoding="utf-8"?>
+<p:sld xmlns:a="http://schemas.openxmlformats.org/drawingml/2006/main" xmlns:r="http://schemas.openxmlformats.org/officeDocument/2006/relationships" xmlns:p="http://schemas.openxmlformats.org/presentationml/2006/main">
+  <p:cSld>
+    <p:spTree>
+      <p:nvGrpSpPr>
+        <p:cNvPr id="1" name=""/>
+        <p:cNvGrpSpPr/>
+        <p:nvPr/>
+      </p:nvGrpSpPr>
+      <p:grpSpPr>
+        <a:xfrm>
+          <a:off x="0" y="0"/>
+          <a:ext cx="0" cy="0"/>
+          <a:chOff x="0" y="0"/>
+          <a:chExt cx="0" cy="0"/>
+        </a:xfrm>
+      </p:grpSpPr>
+      <p:sp>
+        <p:nvSpPr>
+          <p:cNvPr id="3" name="Content Placeholder 2"/>
+          <p:cNvSpPr>
+            <a:spLocks noGrp="1"/>
+          </p:cNvSpPr>
+          <p:nvPr>
+            <p:ph idx="1"/>
+          </p:nvPr>
+        </p:nvSpPr>
+        <p:spPr>
+          <a:xfrm>
+            <a:off x="677334" y="609601"/>
+            <a:ext cx="8596668" cy="5431762"/>
+          </a:xfrm>
+        </p:spPr>
+        <p:txBody>
+          <a:bodyPr/>
+          <a:lstStyle/>
+          <a:p>
+            <a:r>
+              <a:rPr lang="en-IE" dirty="0"/>
+              <a:t>The syntax should be auto generated from the assert button but this section of the controller can also take user input to amend to the script.</a:t>
+            </a:r>
+          </a:p>
+          <a:p>
+            <a:r>
+              <a:rPr lang="en-IE" dirty="0"/>
+              <a:t>To test the expression press the test button and “True” should be outputted in the box below or a failure message if incorrect.</a:t>
+            </a:r>
+          </a:p>
+          <a:p>
+            <a:r>
+              <a:rPr lang="en-IE" dirty="0"/>
+              <a:t>TO add the expression to the script press amend to script.</a:t>
+            </a:r>
+          </a:p>
+          <a:p>
+            <a:r>
+              <a:rPr lang="en-IE" dirty="0"/>
+              <a:t>Now we have our script finished press the stop recoding button.</a:t>
+            </a:r>
+          </a:p>
+        </p:txBody>
+      </p:sp>
+    </p:spTree>
+    <p:extLst>
+      <p:ext uri="{BB962C8B-B14F-4D97-AF65-F5344CB8AC3E}">
+        <p14:creationId xmlns:p14="http://schemas.microsoft.com/office/powerpoint/2010/main" val="3358661085"/>
+      </p:ext>
+    </p:extLst>
+  </p:cSld>
+  <p:clrMapOvr>
+    <a:masterClrMapping/>
+  </p:clrMapOvr>
+</p:sld>
+</file>
+
+<file path=ppt/slides/slide23.xml><?xml version="1.0" encoding="utf-8"?>
+<p:sld xmlns:a="http://schemas.openxmlformats.org/drawingml/2006/main" xmlns:r="http://schemas.openxmlformats.org/officeDocument/2006/relationships" xmlns:p="http://schemas.openxmlformats.org/presentationml/2006/main">
+  <p:cSld>
+    <p:spTree>
+      <p:nvGrpSpPr>
+        <p:cNvPr id="1" name=""/>
+        <p:cNvGrpSpPr/>
+        <p:nvPr/>
+      </p:nvGrpSpPr>
+      <p:grpSpPr>
+        <a:xfrm>
+          <a:off x="0" y="0"/>
+          <a:ext cx="0" cy="0"/>
+          <a:chOff x="0" y="0"/>
+          <a:chExt cx="0" cy="0"/>
+        </a:xfrm>
+      </p:grpSpPr>
+      <p:sp>
+        <p:nvSpPr>
+          <p:cNvPr id="2" name="Title 1"/>
+          <p:cNvSpPr>
+            <a:spLocks noGrp="1"/>
+          </p:cNvSpPr>
+          <p:nvPr>
+            <p:ph type="title"/>
+          </p:nvPr>
+        </p:nvSpPr>
+        <p:spPr>
+          <a:xfrm>
+            <a:off x="677334" y="609600"/>
+            <a:ext cx="8596668" cy="705853"/>
+          </a:xfrm>
+        </p:spPr>
+        <p:txBody>
+          <a:bodyPr/>
+          <a:lstStyle/>
+          <a:p>
+            <a:r>
+              <a:rPr lang="en-IE" dirty="0"/>
+              <a:t>Playback recorded scripts</a:t>
+            </a:r>
+          </a:p>
+        </p:txBody>
+      </p:sp>
+      <p:sp>
+        <p:nvSpPr>
+          <p:cNvPr id="3" name="Content Placeholder 2"/>
+          <p:cNvSpPr>
+            <a:spLocks noGrp="1"/>
+          </p:cNvSpPr>
+          <p:nvPr>
+            <p:ph idx="1"/>
+          </p:nvPr>
+        </p:nvSpPr>
+        <p:spPr>
+          <a:xfrm>
+            <a:off x="677334" y="1315453"/>
+            <a:ext cx="8596668" cy="4725909"/>
+          </a:xfrm>
+        </p:spPr>
+        <p:txBody>
+          <a:bodyPr/>
+          <a:lstStyle/>
+          <a:p>
+            <a:r>
+              <a:rPr lang="en-IE" dirty="0"/>
+              <a:t>To run a test script open the playback tab in the controller and enter the file name and the starting URL for the test and press the set button. The page we have been recording on should refresh to the starting </a:t>
+            </a:r>
+            <a:r>
+              <a:rPr lang="en-IE" dirty="0" err="1"/>
+              <a:t>url</a:t>
+            </a:r>
+            <a:r>
+              <a:rPr lang="en-IE" dirty="0"/>
+              <a:t>.</a:t>
+            </a:r>
+          </a:p>
+          <a:p>
+            <a:endParaRPr lang="en-IE" dirty="0"/>
+          </a:p>
+        </p:txBody>
+      </p:sp>
+      <p:pic>
+        <p:nvPicPr>
+          <p:cNvPr id="4" name="Picture 3"/>
+          <p:cNvPicPr>
+            <a:picLocks noChangeAspect="1"/>
+          </p:cNvPicPr>
+          <p:nvPr/>
+        </p:nvPicPr>
+        <p:blipFill>
+          <a:blip r:embed="rId2"/>
+          <a:stretch>
+            <a:fillRect/>
+          </a:stretch>
+        </p:blipFill>
+        <p:spPr>
+          <a:xfrm>
+            <a:off x="677334" y="2765473"/>
+            <a:ext cx="9826543" cy="2623376"/>
+          </a:xfrm>
+          <a:prstGeom prst="rect">
+            <a:avLst/>
+          </a:prstGeom>
+        </p:spPr>
+      </p:pic>
+    </p:spTree>
+    <p:extLst>
+      <p:ext uri="{BB962C8B-B14F-4D97-AF65-F5344CB8AC3E}">
+        <p14:creationId xmlns:p14="http://schemas.microsoft.com/office/powerpoint/2010/main" val="3636152582"/>
+      </p:ext>
+    </p:extLst>
+  </p:cSld>
+  <p:clrMapOvr>
+    <a:masterClrMapping/>
+  </p:clrMapOvr>
+</p:sld>
+</file>
+
+<file path=ppt/slides/slide24.xml><?xml version="1.0" encoding="utf-8"?>
+<p:sld xmlns:a="http://schemas.openxmlformats.org/drawingml/2006/main" xmlns:r="http://schemas.openxmlformats.org/officeDocument/2006/relationships" xmlns:p="http://schemas.openxmlformats.org/presentationml/2006/main">
+  <p:cSld>
+    <p:spTree>
+      <p:nvGrpSpPr>
+        <p:cNvPr id="1" name=""/>
+        <p:cNvGrpSpPr/>
+        <p:nvPr/>
+      </p:nvGrpSpPr>
+      <p:grpSpPr>
+        <a:xfrm>
+          <a:off x="0" y="0"/>
+          <a:ext cx="0" cy="0"/>
+          <a:chOff x="0" y="0"/>
+          <a:chExt cx="0" cy="0"/>
+        </a:xfrm>
+      </p:grpSpPr>
+      <p:sp>
+        <p:nvSpPr>
+          <p:cNvPr id="5" name="Content Placeholder 4"/>
+          <p:cNvSpPr>
+            <a:spLocks noGrp="1"/>
+          </p:cNvSpPr>
+          <p:nvPr>
+            <p:ph idx="1"/>
+          </p:nvPr>
+        </p:nvSpPr>
+        <p:spPr>
+          <a:xfrm>
+            <a:off x="661292" y="829841"/>
+            <a:ext cx="4457374" cy="5642777"/>
+          </a:xfrm>
+        </p:spPr>
+        <p:txBody>
+          <a:bodyPr/>
+          <a:lstStyle/>
+          <a:p>
+            <a:r>
+              <a:rPr lang="en-IE" dirty="0"/>
+              <a:t>Play – Runs the entire script.</a:t>
+            </a:r>
+          </a:p>
+          <a:p>
+            <a:r>
+              <a:rPr lang="en-IE" dirty="0"/>
+              <a:t>Pause – pauses the script when running.</a:t>
+            </a:r>
+          </a:p>
+          <a:p>
+            <a:r>
+              <a:rPr lang="en-IE" dirty="0"/>
+              <a:t>Step – Step through actions one by one. Useful for debugging scripts as well as failures.</a:t>
+            </a:r>
+          </a:p>
+          <a:p>
+            <a:r>
+              <a:rPr lang="en-IE" dirty="0"/>
+              <a:t>Stop – Stops the script from running.</a:t>
+            </a:r>
+          </a:p>
+          <a:p>
+            <a:endParaRPr lang="en-IE" dirty="0"/>
+          </a:p>
+          <a:p>
+            <a:r>
+              <a:rPr lang="en-IE" dirty="0"/>
+              <a:t>To refresh and rerun a script simply press the set button again to refresh the page.</a:t>
+            </a:r>
+          </a:p>
+        </p:txBody>
+      </p:sp>
+      <p:pic>
+        <p:nvPicPr>
+          <p:cNvPr id="6" name="Picture 5"/>
+          <p:cNvPicPr>
+            <a:picLocks noChangeAspect="1"/>
+          </p:cNvPicPr>
+          <p:nvPr/>
+        </p:nvPicPr>
+        <p:blipFill>
+          <a:blip r:embed="rId2"/>
+          <a:stretch>
+            <a:fillRect/>
+          </a:stretch>
+        </p:blipFill>
+        <p:spPr>
+          <a:xfrm>
+            <a:off x="5757495" y="1261099"/>
+            <a:ext cx="6246935" cy="4780263"/>
+          </a:xfrm>
+          <a:prstGeom prst="rect">
+            <a:avLst/>
+          </a:prstGeom>
+        </p:spPr>
+      </p:pic>
+    </p:spTree>
+    <p:extLst>
+      <p:ext uri="{BB962C8B-B14F-4D97-AF65-F5344CB8AC3E}">
+        <p14:creationId xmlns:p14="http://schemas.microsoft.com/office/powerpoint/2010/main" val="1031806603"/>
+      </p:ext>
+    </p:extLst>
+  </p:cSld>
+  <p:clrMapOvr>
+    <a:masterClrMapping/>
+  </p:clrMapOvr>
+</p:sld>
+</file>
+
+<file path=ppt/slides/slide25.xml><?xml version="1.0" encoding="utf-8"?>
+<p:sld xmlns:a="http://schemas.openxmlformats.org/drawingml/2006/main" xmlns:r="http://schemas.openxmlformats.org/officeDocument/2006/relationships" xmlns:p="http://schemas.openxmlformats.org/presentationml/2006/main">
+  <p:cSld>
+    <p:spTree>
+      <p:nvGrpSpPr>
+        <p:cNvPr id="1" name=""/>
+        <p:cNvGrpSpPr/>
+        <p:nvPr/>
+      </p:nvGrpSpPr>
+      <p:grpSpPr>
+        <a:xfrm>
+          <a:off x="0" y="0"/>
+          <a:ext cx="0" cy="0"/>
+          <a:chOff x="0" y="0"/>
+          <a:chExt cx="0" cy="0"/>
+        </a:xfrm>
+      </p:grpSpPr>
+      <p:sp>
+        <p:nvSpPr>
+          <p:cNvPr id="2" name="Title 1"/>
+          <p:cNvSpPr>
+            <a:spLocks noGrp="1"/>
+          </p:cNvSpPr>
+          <p:nvPr>
+            <p:ph type="title"/>
+          </p:nvPr>
+        </p:nvSpPr>
+        <p:spPr>
+          <a:xfrm>
+            <a:off x="677334" y="609600"/>
+            <a:ext cx="8596668" cy="770021"/>
+          </a:xfrm>
+        </p:spPr>
+        <p:txBody>
+          <a:bodyPr/>
+          <a:lstStyle/>
+          <a:p>
+            <a:r>
+              <a:rPr lang="en-IE" dirty="0"/>
+              <a:t>View Test Logs</a:t>
+            </a:r>
+          </a:p>
+        </p:txBody>
+      </p:sp>
+      <p:sp>
+        <p:nvSpPr>
+          <p:cNvPr id="3" name="Content Placeholder 2"/>
+          <p:cNvSpPr>
+            <a:spLocks noGrp="1"/>
+          </p:cNvSpPr>
+          <p:nvPr>
+            <p:ph idx="1"/>
+          </p:nvPr>
+        </p:nvSpPr>
+        <p:spPr>
+          <a:xfrm>
+            <a:off x="677334" y="1379621"/>
+            <a:ext cx="8596668" cy="4661741"/>
+          </a:xfrm>
+        </p:spPr>
+        <p:txBody>
+          <a:bodyPr/>
+          <a:lstStyle/>
+          <a:p>
+            <a:r>
+              <a:rPr lang="en-IE" dirty="0"/>
+              <a:t>To view the logs either click the link at the bottom of the controller or the link from the SAHI application itself. A new browser tab will open.(Ordered By Date)</a:t>
+            </a:r>
+          </a:p>
+          <a:p>
+            <a:endParaRPr lang="en-IE" dirty="0"/>
+          </a:p>
+          <a:p>
+            <a:endParaRPr lang="en-IE" dirty="0"/>
+          </a:p>
+        </p:txBody>
+      </p:sp>
+      <p:pic>
+        <p:nvPicPr>
+          <p:cNvPr id="4" name="Picture 3"/>
+          <p:cNvPicPr>
+            <a:picLocks noChangeAspect="1"/>
+          </p:cNvPicPr>
+          <p:nvPr/>
+        </p:nvPicPr>
+        <p:blipFill>
+          <a:blip r:embed="rId2"/>
+          <a:stretch>
+            <a:fillRect/>
+          </a:stretch>
+        </p:blipFill>
+        <p:spPr>
+          <a:xfrm>
+            <a:off x="2489898" y="2135908"/>
+            <a:ext cx="4965979" cy="4722091"/>
+          </a:xfrm>
+          <a:prstGeom prst="rect">
+            <a:avLst/>
+          </a:prstGeom>
+        </p:spPr>
+      </p:pic>
+    </p:spTree>
+    <p:extLst>
+      <p:ext uri="{BB962C8B-B14F-4D97-AF65-F5344CB8AC3E}">
+        <p14:creationId xmlns:p14="http://schemas.microsoft.com/office/powerpoint/2010/main" val="2218212479"/>
+      </p:ext>
+    </p:extLst>
+  </p:cSld>
+  <p:clrMapOvr>
+    <a:masterClrMapping/>
+  </p:clrMapOvr>
+</p:sld>
+</file>
+
+<file path=ppt/slides/slide26.xml><?xml version="1.0" encoding="utf-8"?>
+<p:sld xmlns:a="http://schemas.openxmlformats.org/drawingml/2006/main" xmlns:r="http://schemas.openxmlformats.org/officeDocument/2006/relationships" xmlns:p="http://schemas.openxmlformats.org/presentationml/2006/main">
+  <p:cSld>
+    <p:spTree>
+      <p:nvGrpSpPr>
+        <p:cNvPr id="1" name=""/>
+        <p:cNvGrpSpPr/>
+        <p:nvPr/>
+      </p:nvGrpSpPr>
+      <p:grpSpPr>
+        <a:xfrm>
+          <a:off x="0" y="0"/>
+          <a:ext cx="0" cy="0"/>
+          <a:chOff x="0" y="0"/>
+          <a:chExt cx="0" cy="0"/>
+        </a:xfrm>
+      </p:grpSpPr>
+      <p:sp>
+        <p:nvSpPr>
+          <p:cNvPr id="3" name="Content Placeholder 2"/>
+          <p:cNvSpPr>
+            <a:spLocks noGrp="1"/>
+          </p:cNvSpPr>
+          <p:nvPr>
+            <p:ph idx="1"/>
+          </p:nvPr>
+        </p:nvSpPr>
+        <p:spPr>
+          <a:xfrm>
+            <a:off x="677334" y="342901"/>
+            <a:ext cx="3551766" cy="5698462"/>
+          </a:xfrm>
+        </p:spPr>
+        <p:txBody>
+          <a:bodyPr/>
+          <a:lstStyle/>
+          <a:p>
+            <a:r>
+              <a:rPr lang="en-IE" dirty="0"/>
+              <a:t>The log is just a record of the test that ran with metrics for success rate, Failures, Errors and time taken to run the test.</a:t>
+            </a:r>
+          </a:p>
+          <a:p>
+            <a:endParaRPr lang="en-IE" dirty="0"/>
+          </a:p>
+          <a:p>
+            <a:r>
+              <a:rPr lang="en-IE" dirty="0"/>
+              <a:t>White – Actions performed</a:t>
+            </a:r>
+          </a:p>
+          <a:p>
+            <a:r>
+              <a:rPr lang="en-IE" dirty="0"/>
+              <a:t>Green – Assertions(Usually Boolean result)</a:t>
+            </a:r>
+          </a:p>
+        </p:txBody>
+      </p:sp>
+      <p:pic>
+        <p:nvPicPr>
+          <p:cNvPr id="5" name="Picture 4"/>
+          <p:cNvPicPr>
+            <a:picLocks noChangeAspect="1"/>
+          </p:cNvPicPr>
+          <p:nvPr/>
+        </p:nvPicPr>
+        <p:blipFill>
+          <a:blip r:embed="rId2"/>
+          <a:stretch>
+            <a:fillRect/>
+          </a:stretch>
+        </p:blipFill>
+        <p:spPr>
+          <a:xfrm>
+            <a:off x="4229100" y="544182"/>
+            <a:ext cx="6059732" cy="5295900"/>
+          </a:xfrm>
+          <a:prstGeom prst="rect">
+            <a:avLst/>
+          </a:prstGeom>
+        </p:spPr>
+      </p:pic>
+    </p:spTree>
+    <p:extLst>
+      <p:ext uri="{BB962C8B-B14F-4D97-AF65-F5344CB8AC3E}">
+        <p14:creationId xmlns:p14="http://schemas.microsoft.com/office/powerpoint/2010/main" val="3335394195"/>
+      </p:ext>
+    </p:extLst>
+  </p:cSld>
+  <p:clrMapOvr>
+    <a:masterClrMapping/>
+  </p:clrMapOvr>
+</p:sld>
+</file>
+
+<file path=ppt/slides/slide27.xml><?xml version="1.0" encoding="utf-8"?>
+<p:sld xmlns:a="http://schemas.openxmlformats.org/drawingml/2006/main" xmlns:r="http://schemas.openxmlformats.org/officeDocument/2006/relationships" xmlns:p="http://schemas.openxmlformats.org/presentationml/2006/main">
+  <p:cSld>
+    <p:spTree>
+      <p:nvGrpSpPr>
+        <p:cNvPr id="1" name=""/>
+        <p:cNvGrpSpPr/>
+        <p:nvPr/>
+      </p:nvGrpSpPr>
+      <p:grpSpPr>
+        <a:xfrm>
+          <a:off x="0" y="0"/>
+          <a:ext cx="0" cy="0"/>
+          <a:chOff x="0" y="0"/>
+          <a:chExt cx="0" cy="0"/>
+        </a:xfrm>
+      </p:grpSpPr>
+      <p:sp>
+        <p:nvSpPr>
+          <p:cNvPr id="2" name="Title 1"/>
+          <p:cNvSpPr>
+            <a:spLocks noGrp="1"/>
+          </p:cNvSpPr>
+          <p:nvPr>
+            <p:ph type="title"/>
+          </p:nvPr>
+        </p:nvSpPr>
+        <p:spPr>
+          <a:xfrm>
+            <a:off x="677334" y="609600"/>
+            <a:ext cx="8596668" cy="781050"/>
+          </a:xfrm>
+        </p:spPr>
+        <p:txBody>
+          <a:bodyPr/>
+          <a:lstStyle/>
+          <a:p>
+            <a:r>
+              <a:rPr lang="en-IE" dirty="0"/>
+              <a:t>How does it apply to us?</a:t>
+            </a:r>
+          </a:p>
+        </p:txBody>
+      </p:sp>
+      <p:sp>
+        <p:nvSpPr>
+          <p:cNvPr id="3" name="Content Placeholder 2"/>
+          <p:cNvSpPr>
+            <a:spLocks noGrp="1"/>
+          </p:cNvSpPr>
+          <p:nvPr>
+            <p:ph idx="1"/>
+          </p:nvPr>
+        </p:nvSpPr>
+        <p:spPr>
+          <a:xfrm>
+            <a:off x="677334" y="1390651"/>
+            <a:ext cx="8596668" cy="4650712"/>
+          </a:xfrm>
+        </p:spPr>
+        <p:txBody>
+          <a:bodyPr/>
+          <a:lstStyle/>
+          <a:p>
+            <a:r>
+              <a:rPr lang="en-IE" dirty="0"/>
+              <a:t>SAHI is a really easy and powerful testing tool with support for a wide variety of browsers and great support for mobile over a local connection.</a:t>
+            </a:r>
+          </a:p>
+          <a:p>
+            <a:r>
+              <a:rPr lang="en-IE" dirty="0"/>
+              <a:t>Scripts are written in native JavaScript syntax which reduces the learning curve by a lot for those who have experience in the language and the frameworks APIS are really easy to use.</a:t>
+            </a:r>
+          </a:p>
+          <a:p>
+            <a:r>
+              <a:rPr lang="en-IE" dirty="0"/>
+              <a:t>Has support for complex use cases through JavaScript functions.</a:t>
+            </a:r>
+          </a:p>
+          <a:p>
+            <a:r>
+              <a:rPr lang="en-IE" dirty="0"/>
+              <a:t>Has great Jenkins integration for test automation (Distributed testing on pro version could be done with the open source version </a:t>
+            </a:r>
+            <a:r>
+              <a:rPr lang="en-IE"/>
+              <a:t>through Jenkins)</a:t>
+            </a:r>
+            <a:endParaRPr lang="en-IE" dirty="0"/>
+          </a:p>
+          <a:p>
+            <a:endParaRPr lang="en-IE" dirty="0"/>
+          </a:p>
+        </p:txBody>
+      </p:sp>
+    </p:spTree>
+    <p:extLst>
+      <p:ext uri="{BB962C8B-B14F-4D97-AF65-F5344CB8AC3E}">
+        <p14:creationId xmlns:p14="http://schemas.microsoft.com/office/powerpoint/2010/main" val="418400250"/>
+      </p:ext>
+    </p:extLst>
+  </p:cSld>
+  <p:clrMapOvr>
+    <a:masterClrMapping/>
+  </p:clrMapOvr>
+</p:sld>
+</file>
+
+<file path=ppt/slides/slide28.xml><?xml version="1.0" encoding="utf-8"?>
+<p:sld xmlns:a="http://schemas.openxmlformats.org/drawingml/2006/main" xmlns:r="http://schemas.openxmlformats.org/officeDocument/2006/relationships" xmlns:p="http://schemas.openxmlformats.org/presentationml/2006/main">
+  <p:cSld>
+    <p:spTree>
+      <p:nvGrpSpPr>
+        <p:cNvPr id="1" name=""/>
+        <p:cNvGrpSpPr/>
+        <p:nvPr/>
+      </p:nvGrpSpPr>
+      <p:grpSpPr>
+        <a:xfrm>
+          <a:off x="0" y="0"/>
+          <a:ext cx="0" cy="0"/>
+          <a:chOff x="0" y="0"/>
+          <a:chExt cx="0" cy="0"/>
+        </a:xfrm>
+      </p:grpSpPr>
+      <p:sp>
+        <p:nvSpPr>
+          <p:cNvPr id="2" name="Title 1"/>
+          <p:cNvSpPr>
+            <a:spLocks noGrp="1"/>
+          </p:cNvSpPr>
+          <p:nvPr>
+            <p:ph type="title"/>
+          </p:nvPr>
+        </p:nvSpPr>
+        <p:spPr>
+          <a:xfrm>
+            <a:off x="677334" y="609600"/>
+            <a:ext cx="8596668" cy="908304"/>
+          </a:xfrm>
+        </p:spPr>
+        <p:txBody>
+          <a:bodyPr/>
+          <a:lstStyle/>
+          <a:p>
+            <a:r>
+              <a:rPr lang="en-GB" dirty="0" smtClean="0"/>
+              <a:t>Strengths</a:t>
+            </a:r>
+            <a:endParaRPr lang="en-GB" dirty="0"/>
+          </a:p>
+        </p:txBody>
+      </p:sp>
+      <p:sp>
+        <p:nvSpPr>
+          <p:cNvPr id="3" name="Content Placeholder 2"/>
+          <p:cNvSpPr>
+            <a:spLocks noGrp="1"/>
+          </p:cNvSpPr>
+          <p:nvPr>
+            <p:ph idx="1"/>
+          </p:nvPr>
+        </p:nvSpPr>
+        <p:spPr>
+          <a:xfrm>
+            <a:off x="677334" y="1419925"/>
+            <a:ext cx="8596668" cy="4926011"/>
+          </a:xfrm>
+        </p:spPr>
+        <p:txBody>
+          <a:bodyPr/>
+          <a:lstStyle/>
+          <a:p>
+            <a:r>
+              <a:rPr lang="en-GB" dirty="0"/>
+              <a:t>Easy to set up </a:t>
+            </a:r>
+            <a:r>
+              <a:rPr lang="en-GB" dirty="0" smtClean="0"/>
+              <a:t>–no additional tools are required .</a:t>
+            </a:r>
+          </a:p>
+          <a:p>
+            <a:r>
+              <a:rPr lang="en-GB" dirty="0" smtClean="0"/>
+              <a:t>Open </a:t>
+            </a:r>
+            <a:r>
+              <a:rPr lang="en-GB" dirty="0"/>
+              <a:t>source tool therefore it is available to everyone. </a:t>
+            </a:r>
+            <a:endParaRPr lang="en-GB" dirty="0" smtClean="0"/>
+          </a:p>
+          <a:p>
+            <a:r>
+              <a:rPr lang="en-US" dirty="0" smtClean="0"/>
+              <a:t>Efficiency- </a:t>
+            </a:r>
+            <a:r>
+              <a:rPr lang="en-US" dirty="0" err="1"/>
+              <a:t>Sahi</a:t>
+            </a:r>
+            <a:r>
+              <a:rPr lang="en-US" dirty="0"/>
+              <a:t> </a:t>
+            </a:r>
+            <a:r>
+              <a:rPr lang="en-US" dirty="0" smtClean="0"/>
+              <a:t>handles </a:t>
+            </a:r>
+            <a:r>
+              <a:rPr lang="en-US" dirty="0"/>
+              <a:t>the repetitive, time consuming tests and it allows the team to focus on the tricky ones. This </a:t>
+            </a:r>
+            <a:r>
+              <a:rPr lang="en-US" dirty="0" smtClean="0"/>
+              <a:t>allows teams </a:t>
+            </a:r>
+            <a:r>
+              <a:rPr lang="en-US" dirty="0"/>
+              <a:t>to be more efficient  therefore saving time </a:t>
+            </a:r>
+            <a:r>
+              <a:rPr lang="en-US" dirty="0" smtClean="0"/>
+              <a:t>and also generating ROI.</a:t>
+            </a:r>
+            <a:endParaRPr lang="en-US" dirty="0"/>
+          </a:p>
+          <a:p>
+            <a:r>
+              <a:rPr lang="en-GB" dirty="0"/>
+              <a:t>Consistent Platform :</a:t>
+            </a:r>
+            <a:r>
+              <a:rPr lang="en-US" dirty="0"/>
+              <a:t> </a:t>
+            </a:r>
+            <a:r>
+              <a:rPr lang="en-US" dirty="0" err="1"/>
+              <a:t>Sahi</a:t>
+            </a:r>
+            <a:r>
+              <a:rPr lang="en-US" dirty="0"/>
+              <a:t> has the ability to run on all browsers. This reduces the number of errors in the testing scenario by going through pre-recorded instructions</a:t>
+            </a:r>
+            <a:r>
+              <a:rPr lang="en-US" dirty="0" smtClean="0"/>
+              <a:t>.</a:t>
+            </a:r>
+          </a:p>
+          <a:p>
+            <a:r>
+              <a:rPr lang="en-US" dirty="0" smtClean="0"/>
+              <a:t> </a:t>
+            </a:r>
+            <a:r>
+              <a:rPr lang="en-US" dirty="0" err="1"/>
+              <a:t>Sahi</a:t>
+            </a:r>
+            <a:r>
+              <a:rPr lang="en-US" dirty="0"/>
+              <a:t> scripts are fast to create and very easy to </a:t>
+            </a:r>
+            <a:r>
+              <a:rPr lang="en-US" dirty="0" smtClean="0"/>
+              <a:t>maintain</a:t>
+            </a:r>
+          </a:p>
+          <a:p>
+            <a:r>
+              <a:rPr lang="en-IE" dirty="0" smtClean="0"/>
+              <a:t>Reporting- Inbuilt </a:t>
+            </a:r>
+            <a:r>
+              <a:rPr lang="en-IE" dirty="0"/>
+              <a:t>HTML reports with click through to relevant portion of </a:t>
+            </a:r>
+            <a:r>
+              <a:rPr lang="en-IE" dirty="0" smtClean="0"/>
+              <a:t>script.</a:t>
+            </a:r>
+          </a:p>
+          <a:p>
+            <a:r>
+              <a:rPr lang="en-IE" dirty="0" err="1"/>
+              <a:t>Sahi</a:t>
+            </a:r>
+            <a:r>
+              <a:rPr lang="en-IE" dirty="0"/>
+              <a:t> is simple for new non-programmer users to get </a:t>
+            </a:r>
+            <a:r>
+              <a:rPr lang="en-IE" dirty="0" smtClean="0"/>
+              <a:t>started</a:t>
+            </a:r>
+          </a:p>
+          <a:p>
+            <a:endParaRPr lang="en-IE" dirty="0" smtClean="0"/>
+          </a:p>
+        </p:txBody>
+      </p:sp>
+    </p:spTree>
+    <p:extLst>
+      <p:ext uri="{BB962C8B-B14F-4D97-AF65-F5344CB8AC3E}">
+        <p14:creationId xmlns:p14="http://schemas.microsoft.com/office/powerpoint/2010/main" val="3672077178"/>
+      </p:ext>
+    </p:extLst>
+  </p:cSld>
+  <p:clrMapOvr>
+    <a:masterClrMapping/>
+  </p:clrMapOvr>
+</p:sld>
+</file>
+
+<file path=ppt/slides/slide29.xml><?xml version="1.0" encoding="utf-8"?>
+<p:sld xmlns:a="http://schemas.openxmlformats.org/drawingml/2006/main" xmlns:r="http://schemas.openxmlformats.org/officeDocument/2006/relationships" xmlns:p="http://schemas.openxmlformats.org/presentationml/2006/main">
+  <p:cSld>
+    <p:spTree>
+      <p:nvGrpSpPr>
+        <p:cNvPr id="1" name=""/>
+        <p:cNvGrpSpPr/>
+        <p:nvPr/>
+      </p:nvGrpSpPr>
+      <p:grpSpPr>
+        <a:xfrm>
+          <a:off x="0" y="0"/>
+          <a:ext cx="0" cy="0"/>
+          <a:chOff x="0" y="0"/>
+          <a:chExt cx="0" cy="0"/>
+        </a:xfrm>
+      </p:grpSpPr>
+      <p:sp>
+        <p:nvSpPr>
+          <p:cNvPr id="2" name="Title 1"/>
+          <p:cNvSpPr>
+            <a:spLocks noGrp="1"/>
+          </p:cNvSpPr>
+          <p:nvPr>
+            <p:ph type="title"/>
+          </p:nvPr>
+        </p:nvSpPr>
+        <p:spPr/>
+        <p:txBody>
+          <a:bodyPr/>
+          <a:lstStyle/>
+          <a:p>
+            <a:r>
+              <a:rPr lang="en-GB" dirty="0" smtClean="0"/>
+              <a:t>Weaknesses</a:t>
+            </a:r>
+            <a:endParaRPr lang="en-GB" dirty="0"/>
+          </a:p>
+        </p:txBody>
+      </p:sp>
+      <p:sp>
+        <p:nvSpPr>
+          <p:cNvPr id="3" name="Content Placeholder 2"/>
+          <p:cNvSpPr>
+            <a:spLocks noGrp="1"/>
+          </p:cNvSpPr>
+          <p:nvPr>
+            <p:ph idx="1"/>
+          </p:nvPr>
+        </p:nvSpPr>
+        <p:spPr/>
+        <p:txBody>
+          <a:bodyPr/>
+          <a:lstStyle/>
+          <a:p>
+            <a:r>
+              <a:rPr lang="en-US" dirty="0"/>
+              <a:t>Support for multiple languages: SAHI uses </a:t>
+            </a:r>
+            <a:r>
+              <a:rPr lang="en-US" dirty="0" err="1"/>
+              <a:t>Javascript</a:t>
+            </a:r>
+            <a:r>
+              <a:rPr lang="en-US" dirty="0"/>
+              <a:t> as its base language. Currently SAHI does not let you create your test cases in other language.</a:t>
+            </a:r>
+          </a:p>
+          <a:p>
+            <a:r>
+              <a:rPr lang="en-GB" dirty="0" err="1"/>
+              <a:t>Sahi</a:t>
+            </a:r>
+            <a:r>
+              <a:rPr lang="en-GB" dirty="0"/>
+              <a:t> application runs separate from the record window.</a:t>
+            </a:r>
+          </a:p>
+          <a:p>
+            <a:r>
+              <a:rPr lang="en-GB" dirty="0"/>
+              <a:t>Browser has to be configured to work with a proxy.</a:t>
+            </a:r>
+            <a:endParaRPr lang="en-US" dirty="0"/>
+          </a:p>
+          <a:p>
+            <a:endParaRPr lang="en-GB" dirty="0"/>
+          </a:p>
+        </p:txBody>
+      </p:sp>
+    </p:spTree>
+    <p:extLst>
+      <p:ext uri="{BB962C8B-B14F-4D97-AF65-F5344CB8AC3E}">
+        <p14:creationId xmlns:p14="http://schemas.microsoft.com/office/powerpoint/2010/main" val="4098745075"/>
       </p:ext>
     </p:extLst>
   </p:cSld>
@@ -7386,6 +8477,175 @@
     <p:extLst>
       <p:ext uri="{BB962C8B-B14F-4D97-AF65-F5344CB8AC3E}">
         <p14:creationId xmlns:p14="http://schemas.microsoft.com/office/powerpoint/2010/main" val="212746894"/>
+      </p:ext>
+    </p:extLst>
+  </p:cSld>
+  <p:clrMapOvr>
+    <a:masterClrMapping/>
+  </p:clrMapOvr>
+</p:sld>
+</file>
+
+<file path=ppt/slides/slide30.xml><?xml version="1.0" encoding="utf-8"?>
+<p:sld xmlns:a="http://schemas.openxmlformats.org/drawingml/2006/main" xmlns:r="http://schemas.openxmlformats.org/officeDocument/2006/relationships" xmlns:p="http://schemas.openxmlformats.org/presentationml/2006/main">
+  <p:cSld>
+    <p:spTree>
+      <p:nvGrpSpPr>
+        <p:cNvPr id="1" name=""/>
+        <p:cNvGrpSpPr/>
+        <p:nvPr/>
+      </p:nvGrpSpPr>
+      <p:grpSpPr>
+        <a:xfrm>
+          <a:off x="0" y="0"/>
+          <a:ext cx="0" cy="0"/>
+          <a:chOff x="0" y="0"/>
+          <a:chExt cx="0" cy="0"/>
+        </a:xfrm>
+      </p:grpSpPr>
+      <p:sp>
+        <p:nvSpPr>
+          <p:cNvPr id="2" name="Title 1"/>
+          <p:cNvSpPr>
+            <a:spLocks noGrp="1"/>
+          </p:cNvSpPr>
+          <p:nvPr>
+            <p:ph type="title"/>
+          </p:nvPr>
+        </p:nvSpPr>
+        <p:spPr>
+          <a:xfrm>
+            <a:off x="0" y="3154017"/>
+            <a:ext cx="9541565" cy="1320800"/>
+          </a:xfrm>
+        </p:spPr>
+        <p:txBody>
+          <a:bodyPr/>
+          <a:lstStyle/>
+          <a:p>
+            <a:pPr algn="ctr"/>
+            <a:r>
+              <a:rPr lang="en-GB" dirty="0"/>
+              <a:t>Questions?</a:t>
+            </a:r>
+          </a:p>
+        </p:txBody>
+      </p:sp>
+    </p:spTree>
+    <p:extLst>
+      <p:ext uri="{BB962C8B-B14F-4D97-AF65-F5344CB8AC3E}">
+        <p14:creationId xmlns:p14="http://schemas.microsoft.com/office/powerpoint/2010/main" val="1097807884"/>
+      </p:ext>
+    </p:extLst>
+  </p:cSld>
+  <p:clrMapOvr>
+    <a:masterClrMapping/>
+  </p:clrMapOvr>
+</p:sld>
+</file>
+
+<file path=ppt/slides/slide31.xml><?xml version="1.0" encoding="utf-8"?>
+<p:sld xmlns:a="http://schemas.openxmlformats.org/drawingml/2006/main" xmlns:r="http://schemas.openxmlformats.org/officeDocument/2006/relationships" xmlns:p="http://schemas.openxmlformats.org/presentationml/2006/main">
+  <p:cSld>
+    <p:spTree>
+      <p:nvGrpSpPr>
+        <p:cNvPr id="1" name=""/>
+        <p:cNvGrpSpPr/>
+        <p:nvPr/>
+      </p:nvGrpSpPr>
+      <p:grpSpPr>
+        <a:xfrm>
+          <a:off x="0" y="0"/>
+          <a:ext cx="0" cy="0"/>
+          <a:chOff x="0" y="0"/>
+          <a:chExt cx="0" cy="0"/>
+        </a:xfrm>
+      </p:grpSpPr>
+      <p:sp>
+        <p:nvSpPr>
+          <p:cNvPr id="2" name="Title 1"/>
+          <p:cNvSpPr>
+            <a:spLocks noGrp="1"/>
+          </p:cNvSpPr>
+          <p:nvPr>
+            <p:ph type="title"/>
+          </p:nvPr>
+        </p:nvSpPr>
+        <p:spPr/>
+        <p:txBody>
+          <a:bodyPr/>
+          <a:lstStyle/>
+          <a:p>
+            <a:r>
+              <a:rPr lang="en-GB" dirty="0"/>
+              <a:t>Team Members</a:t>
+            </a:r>
+          </a:p>
+        </p:txBody>
+      </p:sp>
+      <p:sp>
+        <p:nvSpPr>
+          <p:cNvPr id="3" name="Content Placeholder 2"/>
+          <p:cNvSpPr>
+            <a:spLocks noGrp="1"/>
+          </p:cNvSpPr>
+          <p:nvPr>
+            <p:ph idx="1"/>
+          </p:nvPr>
+        </p:nvSpPr>
+        <p:spPr/>
+        <p:txBody>
+          <a:bodyPr/>
+          <a:lstStyle/>
+          <a:p>
+            <a:r>
+              <a:rPr lang="en-GB" dirty="0" err="1"/>
+              <a:t>Aleksander</a:t>
+            </a:r>
+            <a:r>
+              <a:rPr lang="en-GB" dirty="0"/>
+              <a:t> </a:t>
+            </a:r>
+            <a:r>
+              <a:rPr lang="en-GB" dirty="0" err="1"/>
+              <a:t>Zoric</a:t>
+            </a:r>
+            <a:endParaRPr lang="en-GB" dirty="0"/>
+          </a:p>
+          <a:p>
+            <a:r>
+              <a:rPr lang="en-GB" dirty="0"/>
+              <a:t>Liranda </a:t>
+            </a:r>
+            <a:r>
+              <a:rPr lang="en-GB" dirty="0" smtClean="0"/>
+              <a:t>Krasniqi</a:t>
+            </a:r>
+            <a:endParaRPr lang="en-GB" dirty="0"/>
+          </a:p>
+          <a:p>
+            <a:r>
+              <a:rPr lang="en-GB" dirty="0"/>
+              <a:t>Chris O’Brien</a:t>
+            </a:r>
+          </a:p>
+          <a:p>
+            <a:r>
+              <a:rPr lang="en-GB" dirty="0"/>
+              <a:t>James </a:t>
+            </a:r>
+            <a:r>
+              <a:rPr lang="en-GB" dirty="0" err="1"/>
+              <a:t>McGarr</a:t>
+            </a:r>
+            <a:endParaRPr lang="en-GB" dirty="0"/>
+          </a:p>
+        </p:txBody>
+      </p:sp>
+    </p:spTree>
+    <p:extLst>
+      <p:ext uri="{BB962C8B-B14F-4D97-AF65-F5344CB8AC3E}">
+        <p14:creationId xmlns:p14="http://schemas.microsoft.com/office/powerpoint/2010/main" val="1022492772"/>
       </p:ext>
     </p:extLst>
   </p:cSld>

</xml_diff>